<commit_message>
last updates i hope
</commit_message>
<xml_diff>
--- a/Edu_presentation.pptx
+++ b/Edu_presentation.pptx
@@ -2522,7 +2522,7 @@
                 <a:latin typeface="Verdana" panose="020B0604030504040204" pitchFamily="34" charset="0"/>
                 <a:ea typeface="Verdana" panose="020B0604030504040204" pitchFamily="34" charset="0"/>
               </a:rPr>
-              <a:t>ПОСТАВЛЕННАЯ ЦЕЛЬ И ВСЕ КОМПЕТЕНЦИИ ЗАКРЫТЫ</a:t>
+              <a:t>ПОСТАВЛЕННАЯ ЦЕЛЬ И ЗАДАЧИ ВЫПОЛНЕНЫ</a:t>
             </a:r>
           </a:p>
         </p:txBody>
@@ -3264,7 +3264,7 @@
         </p:nvSpPr>
         <p:spPr>
           <a:xfrm>
-            <a:off x="387348" y="1960779"/>
+            <a:off x="387348" y="2043907"/>
             <a:ext cx="7767784" cy="523220"/>
           </a:xfrm>
           <a:prstGeom prst="rect">
@@ -3278,6 +3278,10 @@
           </a:bodyPr>
           <a:lstStyle/>
           <a:p>
+            <a:pPr marL="457200" indent="-457200">
+              <a:buFont typeface="Wingdings" panose="05000000000000000000" pitchFamily="2" charset="2"/>
+              <a:buChar char="Ø"/>
+            </a:pPr>
             <a:r>
               <a:rPr lang="ru-RU" sz="2800" dirty="0">
                 <a:solidFill>
@@ -3305,7 +3309,7 @@
         </p:nvSpPr>
         <p:spPr>
           <a:xfrm>
-            <a:off x="387348" y="3010484"/>
+            <a:off x="387348" y="3093612"/>
             <a:ext cx="9707420" cy="523220"/>
           </a:xfrm>
           <a:prstGeom prst="rect">
@@ -3319,6 +3323,10 @@
           </a:bodyPr>
           <a:lstStyle/>
           <a:p>
+            <a:pPr marL="457200" indent="-457200">
+              <a:buFont typeface="Wingdings" panose="05000000000000000000" pitchFamily="2" charset="2"/>
+              <a:buChar char="Ø"/>
+            </a:pPr>
             <a:r>
               <a:rPr lang="ru-RU" sz="2800" dirty="0">
                 <a:solidFill>
@@ -3346,8 +3354,8 @@
         </p:nvSpPr>
         <p:spPr>
           <a:xfrm>
-            <a:off x="582468" y="3533704"/>
-            <a:ext cx="8802832" cy="1679627"/>
+            <a:off x="998103" y="3603772"/>
+            <a:ext cx="9291205" cy="1679627"/>
           </a:xfrm>
           <a:prstGeom prst="rect">
             <a:avLst/>
@@ -4542,7 +4550,7 @@
           </a:fontRef>
         </p:style>
         <p:txBody>
-          <a:bodyPr rtlCol="0" anchor="ctr"/>
+          <a:bodyPr rtlCol="0" anchor="b"/>
           <a:lstStyle/>
           <a:p>
             <a:pPr algn="ctr"/>
@@ -4568,12 +4576,12 @@
         </p:nvSpPr>
         <p:spPr>
           <a:xfrm>
-            <a:off x="0" y="134552"/>
+            <a:off x="314325" y="161624"/>
             <a:ext cx="8636007" cy="859127"/>
           </a:xfrm>
         </p:spPr>
         <p:txBody>
-          <a:bodyPr/>
+          <a:bodyPr anchor="b"/>
           <a:lstStyle/>
           <a:p>
             <a:pPr algn="l"/>
@@ -4617,7 +4625,7 @@
         </p:blipFill>
         <p:spPr bwMode="auto">
           <a:xfrm>
-            <a:off x="9915954" y="1868799"/>
+            <a:off x="9516279" y="1784215"/>
             <a:ext cx="1349119" cy="1449801"/>
           </a:xfrm>
           <a:prstGeom prst="rect">
@@ -4672,8 +4680,8 @@
         </p:blipFill>
         <p:spPr bwMode="auto">
           <a:xfrm flipH="1" flipV="1">
-            <a:off x="5313798" y="1958109"/>
-            <a:ext cx="1872812" cy="1170500"/>
+            <a:off x="5071486" y="1868799"/>
+            <a:ext cx="2049027" cy="1280634"/>
           </a:xfrm>
           <a:prstGeom prst="rect">
             <a:avLst/>
@@ -4700,10 +4708,10 @@
       </p:pic>
       <p:pic>
         <p:nvPicPr>
-          <p:cNvPr id="1036" name="Picture 12" descr="Picture background">
-            <a:extLst>
-              <a:ext uri="{FF2B5EF4-FFF2-40B4-BE49-F238E27FC236}">
-                <a16:creationId xmlns:a16="http://schemas.microsoft.com/office/drawing/2014/main" id="{94892BE9-430E-4D9E-8091-B5637179B72C}"/>
+          <p:cNvPr id="1038" name="Picture 14">
+            <a:extLst>
+              <a:ext uri="{FF2B5EF4-FFF2-40B4-BE49-F238E27FC236}">
+                <a16:creationId xmlns:a16="http://schemas.microsoft.com/office/drawing/2014/main" id="{D00749DB-3BCA-4BE5-8F01-741EE710BE54}"/>
               </a:ext>
             </a:extLst>
           </p:cNvPr>
@@ -4727,8 +4735,223 @@
         </p:blipFill>
         <p:spPr bwMode="auto">
           <a:xfrm>
-            <a:off x="841053" y="1958109"/>
-            <a:ext cx="1936970" cy="1001019"/>
+            <a:off x="5401586" y="4427044"/>
+            <a:ext cx="1388828" cy="1388828"/>
+          </a:xfrm>
+          <a:prstGeom prst="rect">
+            <a:avLst/>
+          </a:prstGeom>
+          <a:noFill/>
+          <a:effectLst>
+            <a:outerShdw blurRad="1270000" dist="50800" dir="5400000" sx="135000" sy="135000" algn="ctr" rotWithShape="0">
+              <a:schemeClr val="accent5">
+                <a:lumMod val="60000"/>
+                <a:lumOff val="40000"/>
+              </a:schemeClr>
+            </a:outerShdw>
+            <a:softEdge rad="0"/>
+          </a:effectLst>
+        </p:spPr>
+      </p:pic>
+      <p:pic>
+        <p:nvPicPr>
+          <p:cNvPr id="1040" name="Picture 16" descr="Picture background">
+            <a:extLst>
+              <a:ext uri="{FF2B5EF4-FFF2-40B4-BE49-F238E27FC236}">
+                <a16:creationId xmlns:a16="http://schemas.microsoft.com/office/drawing/2014/main" id="{163F9C1F-4BC7-43A2-94EC-6FB074D4E6E0}"/>
+              </a:ext>
+            </a:extLst>
+          </p:cNvPr>
+          <p:cNvPicPr>
+            <a:picLocks noChangeAspect="1" noChangeArrowheads="1"/>
+          </p:cNvPicPr>
+          <p:nvPr/>
+        </p:nvPicPr>
+        <p:blipFill>
+          <a:blip r:embed="rId6">
+            <a:extLst>
+              <a:ext uri="{28A0092B-C50C-407E-A947-70E740481C1C}">
+                <a14:useLocalDpi xmlns:a14="http://schemas.microsoft.com/office/drawing/2010/main" val="0"/>
+              </a:ext>
+            </a:extLst>
+          </a:blip>
+          <a:srcRect/>
+          <a:stretch>
+            <a:fillRect/>
+          </a:stretch>
+        </p:blipFill>
+        <p:spPr bwMode="auto">
+          <a:xfrm>
+            <a:off x="9496425" y="4427044"/>
+            <a:ext cx="1388828" cy="1388828"/>
+          </a:xfrm>
+          <a:prstGeom prst="rect">
+            <a:avLst/>
+          </a:prstGeom>
+          <a:noFill/>
+          <a:effectLst>
+            <a:outerShdw blurRad="1270000" dist="50800" dir="5400000" sx="135000" sy="135000" algn="ctr" rotWithShape="0">
+              <a:schemeClr val="accent5">
+                <a:lumMod val="60000"/>
+                <a:lumOff val="40000"/>
+              </a:schemeClr>
+            </a:outerShdw>
+          </a:effectLst>
+          <a:extLst>
+            <a:ext uri="{909E8E84-426E-40DD-AFC4-6F175D3DCCD1}">
+              <a14:hiddenFill xmlns:a14="http://schemas.microsoft.com/office/drawing/2010/main">
+                <a:solidFill>
+                  <a:srgbClr val="FFFFFF"/>
+                </a:solidFill>
+              </a14:hiddenFill>
+            </a:ext>
+          </a:extLst>
+        </p:spPr>
+      </p:pic>
+      <p:sp>
+        <p:nvSpPr>
+          <p:cNvPr id="43" name="TextBox 42">
+            <a:extLst>
+              <a:ext uri="{FF2B5EF4-FFF2-40B4-BE49-F238E27FC236}">
+                <a16:creationId xmlns:a16="http://schemas.microsoft.com/office/drawing/2014/main" id="{78E6945D-4BD4-4350-8A4F-46FC7DD16881}"/>
+              </a:ext>
+            </a:extLst>
+          </p:cNvPr>
+          <p:cNvSpPr txBox="1"/>
+          <p:nvPr/>
+        </p:nvSpPr>
+        <p:spPr>
+          <a:xfrm>
+            <a:off x="11179278" y="6211669"/>
+            <a:ext cx="1012722" cy="646331"/>
+          </a:xfrm>
+          <a:prstGeom prst="rect">
+            <a:avLst/>
+          </a:prstGeom>
+          <a:noFill/>
+        </p:spPr>
+        <p:txBody>
+          <a:bodyPr wrap="square" rtlCol="0" anchor="b">
+            <a:spAutoFit/>
+          </a:bodyPr>
+          <a:lstStyle/>
+          <a:p>
+            <a:r>
+              <a:rPr lang="ru-RU" sz="3600" dirty="0">
+                <a:solidFill>
+                  <a:schemeClr val="bg1"/>
+                </a:solidFill>
+                <a:latin typeface="Verdana" panose="020B0604030504040204" pitchFamily="34" charset="0"/>
+                <a:ea typeface="Verdana" panose="020B0604030504040204" pitchFamily="34" charset="0"/>
+              </a:rPr>
+              <a:t>6</a:t>
+            </a:r>
+            <a:r>
+              <a:rPr lang="en-US" sz="3600" dirty="0">
+                <a:solidFill>
+                  <a:schemeClr val="bg1"/>
+                </a:solidFill>
+                <a:latin typeface="Verdana" panose="020B0604030504040204" pitchFamily="34" charset="0"/>
+                <a:ea typeface="Verdana" panose="020B0604030504040204" pitchFamily="34" charset="0"/>
+              </a:rPr>
+              <a:t>/9</a:t>
+            </a:r>
+            <a:endParaRPr lang="ru-RU" sz="3600" dirty="0">
+              <a:solidFill>
+                <a:schemeClr val="bg1"/>
+              </a:solidFill>
+              <a:latin typeface="Verdana" panose="020B0604030504040204" pitchFamily="34" charset="0"/>
+              <a:ea typeface="Verdana" panose="020B0604030504040204" pitchFamily="34" charset="0"/>
+            </a:endParaRPr>
+          </a:p>
+        </p:txBody>
+      </p:sp>
+      <p:pic>
+        <p:nvPicPr>
+          <p:cNvPr id="6" name="Picture 14" descr="Mysql workbench Icon">
+            <a:extLst>
+              <a:ext uri="{FF2B5EF4-FFF2-40B4-BE49-F238E27FC236}">
+                <a16:creationId xmlns:a16="http://schemas.microsoft.com/office/drawing/2014/main" id="{B888169B-2212-45D0-BB5C-06222686A255}"/>
+              </a:ext>
+            </a:extLst>
+          </p:cNvPr>
+          <p:cNvPicPr>
+            <a:picLocks noChangeAspect="1" noChangeArrowheads="1"/>
+          </p:cNvPicPr>
+          <p:nvPr/>
+        </p:nvPicPr>
+        <p:blipFill>
+          <a:blip r:embed="rId7">
+            <a:extLst>
+              <a:ext uri="{28A0092B-C50C-407E-A947-70E740481C1C}">
+                <a14:useLocalDpi xmlns:a14="http://schemas.microsoft.com/office/drawing/2010/main" val="0"/>
+              </a:ext>
+            </a:extLst>
+          </a:blip>
+          <a:srcRect/>
+          <a:stretch>
+            <a:fillRect/>
+          </a:stretch>
+        </p:blipFill>
+        <p:spPr bwMode="auto">
+          <a:xfrm>
+            <a:off x="1101919" y="4324630"/>
+            <a:ext cx="1593656" cy="1593656"/>
+          </a:xfrm>
+          <a:prstGeom prst="rect">
+            <a:avLst/>
+          </a:prstGeom>
+          <a:noFill/>
+          <a:effectLst>
+            <a:outerShdw blurRad="1270000" dist="50800" dir="5400000" sx="135000" sy="135000" algn="ctr" rotWithShape="0">
+              <a:schemeClr val="accent5">
+                <a:lumMod val="60000"/>
+                <a:lumOff val="40000"/>
+              </a:schemeClr>
+            </a:outerShdw>
+          </a:effectLst>
+          <a:extLst>
+            <a:ext uri="{909E8E84-426E-40DD-AFC4-6F175D3DCCD1}">
+              <a14:hiddenFill xmlns:a14="http://schemas.microsoft.com/office/drawing/2010/main">
+                <a:solidFill>
+                  <a:srgbClr val="FFFFFF"/>
+                </a:solidFill>
+              </a14:hiddenFill>
+            </a:ext>
+          </a:extLst>
+        </p:spPr>
+      </p:pic>
+      <p:pic>
+        <p:nvPicPr>
+          <p:cNvPr id="1036" name="Picture 12" descr="Picture background">
+            <a:extLst>
+              <a:ext uri="{FF2B5EF4-FFF2-40B4-BE49-F238E27FC236}">
+                <a16:creationId xmlns:a16="http://schemas.microsoft.com/office/drawing/2014/main" id="{94892BE9-430E-4D9E-8091-B5637179B72C}"/>
+              </a:ext>
+            </a:extLst>
+          </p:cNvPr>
+          <p:cNvPicPr>
+            <a:picLocks noChangeAspect="1" noChangeArrowheads="1"/>
+          </p:cNvPicPr>
+          <p:nvPr/>
+        </p:nvPicPr>
+        <p:blipFill>
+          <a:blip r:embed="rId8">
+            <a:extLst>
+              <a:ext uri="{28A0092B-C50C-407E-A947-70E740481C1C}">
+                <a14:useLocalDpi xmlns:a14="http://schemas.microsoft.com/office/drawing/2010/main" val="0"/>
+              </a:ext>
+            </a:extLst>
+          </a:blip>
+          <a:srcRect/>
+          <a:stretch>
+            <a:fillRect/>
+          </a:stretch>
+        </p:blipFill>
+        <p:spPr bwMode="auto">
+          <a:xfrm>
+            <a:off x="822003" y="1868799"/>
+            <a:ext cx="2127368" cy="1099416"/>
           </a:xfrm>
           <a:prstGeom prst="rect">
             <a:avLst/>
@@ -4753,593 +4976,6 @@
           </a:extLst>
         </p:spPr>
       </p:pic>
-      <p:pic>
-        <p:nvPicPr>
-          <p:cNvPr id="1038" name="Picture 14">
-            <a:extLst>
-              <a:ext uri="{FF2B5EF4-FFF2-40B4-BE49-F238E27FC236}">
-                <a16:creationId xmlns:a16="http://schemas.microsoft.com/office/drawing/2014/main" id="{D00749DB-3BCA-4BE5-8F01-741EE710BE54}"/>
-              </a:ext>
-            </a:extLst>
-          </p:cNvPr>
-          <p:cNvPicPr>
-            <a:picLocks noChangeAspect="1" noChangeArrowheads="1"/>
-          </p:cNvPicPr>
-          <p:nvPr/>
-        </p:nvPicPr>
-        <p:blipFill>
-          <a:blip r:embed="rId6">
-            <a:extLst>
-              <a:ext uri="{28A0092B-C50C-407E-A947-70E740481C1C}">
-                <a14:useLocalDpi xmlns:a14="http://schemas.microsoft.com/office/drawing/2010/main" val="0"/>
-              </a:ext>
-            </a:extLst>
-          </a:blip>
-          <a:srcRect/>
-          <a:stretch>
-            <a:fillRect/>
-          </a:stretch>
-        </p:blipFill>
-        <p:spPr bwMode="auto">
-          <a:xfrm>
-            <a:off x="5791124" y="4733408"/>
-            <a:ext cx="1082253" cy="1082253"/>
-          </a:xfrm>
-          <a:prstGeom prst="rect">
-            <a:avLst/>
-          </a:prstGeom>
-          <a:noFill/>
-          <a:effectLst>
-            <a:outerShdw blurRad="1270000" dist="50800" dir="5400000" sx="135000" sy="135000" algn="ctr" rotWithShape="0">
-              <a:schemeClr val="accent5">
-                <a:lumMod val="60000"/>
-                <a:lumOff val="40000"/>
-              </a:schemeClr>
-            </a:outerShdw>
-            <a:softEdge rad="0"/>
-          </a:effectLst>
-        </p:spPr>
-      </p:pic>
-      <p:pic>
-        <p:nvPicPr>
-          <p:cNvPr id="1040" name="Picture 16" descr="Picture background">
-            <a:extLst>
-              <a:ext uri="{FF2B5EF4-FFF2-40B4-BE49-F238E27FC236}">
-                <a16:creationId xmlns:a16="http://schemas.microsoft.com/office/drawing/2014/main" id="{163F9C1F-4BC7-43A2-94EC-6FB074D4E6E0}"/>
-              </a:ext>
-            </a:extLst>
-          </p:cNvPr>
-          <p:cNvPicPr>
-            <a:picLocks noChangeAspect="1" noChangeArrowheads="1"/>
-          </p:cNvPicPr>
-          <p:nvPr/>
-        </p:nvPicPr>
-        <p:blipFill>
-          <a:blip r:embed="rId7">
-            <a:extLst>
-              <a:ext uri="{28A0092B-C50C-407E-A947-70E740481C1C}">
-                <a14:useLocalDpi xmlns:a14="http://schemas.microsoft.com/office/drawing/2010/main" val="0"/>
-              </a:ext>
-            </a:extLst>
-          </a:blip>
-          <a:srcRect/>
-          <a:stretch>
-            <a:fillRect/>
-          </a:stretch>
-        </p:blipFill>
-        <p:spPr bwMode="auto">
-          <a:xfrm>
-            <a:off x="10022364" y="4733408"/>
-            <a:ext cx="1136297" cy="1136297"/>
-          </a:xfrm>
-          <a:prstGeom prst="rect">
-            <a:avLst/>
-          </a:prstGeom>
-          <a:noFill/>
-          <a:effectLst>
-            <a:outerShdw blurRad="1270000" dist="50800" dir="5400000" sx="135000" sy="135000" algn="ctr" rotWithShape="0">
-              <a:schemeClr val="accent5">
-                <a:lumMod val="60000"/>
-                <a:lumOff val="40000"/>
-              </a:schemeClr>
-            </a:outerShdw>
-          </a:effectLst>
-          <a:extLst>
-            <a:ext uri="{909E8E84-426E-40DD-AFC4-6F175D3DCCD1}">
-              <a14:hiddenFill xmlns:a14="http://schemas.microsoft.com/office/drawing/2010/main">
-                <a:solidFill>
-                  <a:srgbClr val="FFFFFF"/>
-                </a:solidFill>
-              </a14:hiddenFill>
-            </a:ext>
-          </a:extLst>
-        </p:spPr>
-      </p:pic>
-      <p:sp>
-        <p:nvSpPr>
-          <p:cNvPr id="43" name="TextBox 42">
-            <a:extLst>
-              <a:ext uri="{FF2B5EF4-FFF2-40B4-BE49-F238E27FC236}">
-                <a16:creationId xmlns:a16="http://schemas.microsoft.com/office/drawing/2014/main" id="{78E6945D-4BD4-4350-8A4F-46FC7DD16881}"/>
-              </a:ext>
-            </a:extLst>
-          </p:cNvPr>
-          <p:cNvSpPr txBox="1"/>
-          <p:nvPr/>
-        </p:nvSpPr>
-        <p:spPr>
-          <a:xfrm>
-            <a:off x="11179278" y="6211669"/>
-            <a:ext cx="1012722" cy="646331"/>
-          </a:xfrm>
-          <a:prstGeom prst="rect">
-            <a:avLst/>
-          </a:prstGeom>
-          <a:noFill/>
-        </p:spPr>
-        <p:txBody>
-          <a:bodyPr wrap="square" rtlCol="0">
-            <a:spAutoFit/>
-          </a:bodyPr>
-          <a:lstStyle/>
-          <a:p>
-            <a:r>
-              <a:rPr lang="ru-RU" sz="3600" dirty="0">
-                <a:solidFill>
-                  <a:schemeClr val="bg1"/>
-                </a:solidFill>
-                <a:latin typeface="Verdana" panose="020B0604030504040204" pitchFamily="34" charset="0"/>
-                <a:ea typeface="Verdana" panose="020B0604030504040204" pitchFamily="34" charset="0"/>
-              </a:rPr>
-              <a:t>6</a:t>
-            </a:r>
-            <a:r>
-              <a:rPr lang="en-US" sz="3600" dirty="0">
-                <a:solidFill>
-                  <a:schemeClr val="bg1"/>
-                </a:solidFill>
-                <a:latin typeface="Verdana" panose="020B0604030504040204" pitchFamily="34" charset="0"/>
-                <a:ea typeface="Verdana" panose="020B0604030504040204" pitchFamily="34" charset="0"/>
-              </a:rPr>
-              <a:t>/9</a:t>
-            </a:r>
-            <a:endParaRPr lang="ru-RU" sz="3600" dirty="0">
-              <a:solidFill>
-                <a:schemeClr val="bg1"/>
-              </a:solidFill>
-              <a:latin typeface="Verdana" panose="020B0604030504040204" pitchFamily="34" charset="0"/>
-              <a:ea typeface="Verdana" panose="020B0604030504040204" pitchFamily="34" charset="0"/>
-            </a:endParaRPr>
-          </a:p>
-        </p:txBody>
-      </p:sp>
-      <p:pic>
-        <p:nvPicPr>
-          <p:cNvPr id="6" name="Picture 14" descr="Mysql workbench Icon">
-            <a:extLst>
-              <a:ext uri="{FF2B5EF4-FFF2-40B4-BE49-F238E27FC236}">
-                <a16:creationId xmlns:a16="http://schemas.microsoft.com/office/drawing/2014/main" id="{B888169B-2212-45D0-BB5C-06222686A255}"/>
-              </a:ext>
-            </a:extLst>
-          </p:cNvPr>
-          <p:cNvPicPr>
-            <a:picLocks noChangeAspect="1" noChangeArrowheads="1"/>
-          </p:cNvPicPr>
-          <p:nvPr/>
-        </p:nvPicPr>
-        <p:blipFill>
-          <a:blip r:embed="rId8">
-            <a:extLst>
-              <a:ext uri="{28A0092B-C50C-407E-A947-70E740481C1C}">
-                <a14:useLocalDpi xmlns:a14="http://schemas.microsoft.com/office/drawing/2010/main" val="0"/>
-              </a:ext>
-            </a:extLst>
-          </a:blip>
-          <a:srcRect/>
-          <a:stretch>
-            <a:fillRect/>
-          </a:stretch>
-        </p:blipFill>
-        <p:spPr bwMode="auto">
-          <a:xfrm>
-            <a:off x="1286339" y="4509050"/>
-            <a:ext cx="1224816" cy="1224816"/>
-          </a:xfrm>
-          <a:prstGeom prst="rect">
-            <a:avLst/>
-          </a:prstGeom>
-          <a:noFill/>
-          <a:effectLst>
-            <a:outerShdw blurRad="1270000" dist="50800" dir="5400000" sx="135000" sy="135000" algn="ctr" rotWithShape="0">
-              <a:schemeClr val="accent5">
-                <a:lumMod val="60000"/>
-                <a:lumOff val="40000"/>
-              </a:schemeClr>
-            </a:outerShdw>
-          </a:effectLst>
-          <a:extLst>
-            <a:ext uri="{909E8E84-426E-40DD-AFC4-6F175D3DCCD1}">
-              <a14:hiddenFill xmlns:a14="http://schemas.microsoft.com/office/drawing/2010/main">
-                <a:solidFill>
-                  <a:srgbClr val="FFFFFF"/>
-                </a:solidFill>
-              </a14:hiddenFill>
-            </a:ext>
-          </a:extLst>
-        </p:spPr>
-      </p:pic>
-      <p:sp>
-        <p:nvSpPr>
-          <p:cNvPr id="21" name="Овал 20">
-            <a:extLst>
-              <a:ext uri="{FF2B5EF4-FFF2-40B4-BE49-F238E27FC236}">
-                <a16:creationId xmlns:a16="http://schemas.microsoft.com/office/drawing/2014/main" id="{D679701C-08D1-4FD1-A1C3-C03405AC0AD2}"/>
-              </a:ext>
-            </a:extLst>
-          </p:cNvPr>
-          <p:cNvSpPr/>
-          <p:nvPr/>
-        </p:nvSpPr>
-        <p:spPr>
-          <a:xfrm>
-            <a:off x="281204" y="1868799"/>
-            <a:ext cx="3202974" cy="1349119"/>
-          </a:xfrm>
-          <a:prstGeom prst="ellipse">
-            <a:avLst/>
-          </a:prstGeom>
-          <a:noFill/>
-          <a:ln>
-            <a:solidFill>
-              <a:schemeClr val="bg1"/>
-            </a:solidFill>
-          </a:ln>
-          <a:effectLst>
-            <a:outerShdw blurRad="1270000" dist="50800" dir="5400000" sx="186000" sy="186000" algn="ctr" rotWithShape="0">
-              <a:schemeClr val="accent5">
-                <a:lumMod val="60000"/>
-                <a:lumOff val="40000"/>
-              </a:schemeClr>
-            </a:outerShdw>
-          </a:effectLst>
-        </p:spPr>
-        <p:style>
-          <a:lnRef idx="2">
-            <a:schemeClr val="accent4"/>
-          </a:lnRef>
-          <a:fillRef idx="1">
-            <a:schemeClr val="lt1"/>
-          </a:fillRef>
-          <a:effectRef idx="0">
-            <a:schemeClr val="accent4"/>
-          </a:effectRef>
-          <a:fontRef idx="minor">
-            <a:schemeClr val="dk1"/>
-          </a:fontRef>
-        </p:style>
-        <p:txBody>
-          <a:bodyPr rtlCol="0" anchor="ctr"/>
-          <a:lstStyle/>
-          <a:p>
-            <a:pPr algn="ctr"/>
-            <a:endParaRPr lang="ru-RU" dirty="0">
-              <a:highlight>
-                <a:srgbClr val="FFFF00"/>
-              </a:highlight>
-            </a:endParaRPr>
-          </a:p>
-        </p:txBody>
-      </p:sp>
-      <p:sp>
-        <p:nvSpPr>
-          <p:cNvPr id="40" name="Овал 39">
-            <a:extLst>
-              <a:ext uri="{FF2B5EF4-FFF2-40B4-BE49-F238E27FC236}">
-                <a16:creationId xmlns:a16="http://schemas.microsoft.com/office/drawing/2014/main" id="{3ACA9DFD-D58F-42E2-8503-3ED981272D02}"/>
-              </a:ext>
-            </a:extLst>
-          </p:cNvPr>
-          <p:cNvSpPr/>
-          <p:nvPr/>
-        </p:nvSpPr>
-        <p:spPr>
-          <a:xfrm>
-            <a:off x="4635115" y="1919138"/>
-            <a:ext cx="3202974" cy="1349119"/>
-          </a:xfrm>
-          <a:prstGeom prst="ellipse">
-            <a:avLst/>
-          </a:prstGeom>
-          <a:noFill/>
-          <a:ln>
-            <a:solidFill>
-              <a:schemeClr val="bg1"/>
-            </a:solidFill>
-          </a:ln>
-          <a:effectLst>
-            <a:outerShdw blurRad="596900" dist="50800" dir="5400000" sx="107000" sy="107000" algn="ctr" rotWithShape="0">
-              <a:schemeClr val="accent5">
-                <a:lumMod val="60000"/>
-                <a:lumOff val="40000"/>
-              </a:schemeClr>
-            </a:outerShdw>
-          </a:effectLst>
-        </p:spPr>
-        <p:style>
-          <a:lnRef idx="2">
-            <a:schemeClr val="accent4"/>
-          </a:lnRef>
-          <a:fillRef idx="1">
-            <a:schemeClr val="lt1"/>
-          </a:fillRef>
-          <a:effectRef idx="0">
-            <a:schemeClr val="accent4"/>
-          </a:effectRef>
-          <a:fontRef idx="minor">
-            <a:schemeClr val="dk1"/>
-          </a:fontRef>
-        </p:style>
-        <p:txBody>
-          <a:bodyPr rtlCol="0" anchor="ctr"/>
-          <a:lstStyle/>
-          <a:p>
-            <a:pPr algn="ctr"/>
-            <a:endParaRPr lang="ru-RU" dirty="0">
-              <a:highlight>
-                <a:srgbClr val="FFFF00"/>
-              </a:highlight>
-            </a:endParaRPr>
-          </a:p>
-        </p:txBody>
-      </p:sp>
-      <p:sp>
-        <p:nvSpPr>
-          <p:cNvPr id="41" name="Овал 40">
-            <a:extLst>
-              <a:ext uri="{FF2B5EF4-FFF2-40B4-BE49-F238E27FC236}">
-                <a16:creationId xmlns:a16="http://schemas.microsoft.com/office/drawing/2014/main" id="{1B1B6449-F3F7-465F-89D5-A0B25EAE8033}"/>
-              </a:ext>
-            </a:extLst>
-          </p:cNvPr>
-          <p:cNvSpPr/>
-          <p:nvPr/>
-        </p:nvSpPr>
-        <p:spPr>
-          <a:xfrm>
-            <a:off x="8989026" y="1919139"/>
-            <a:ext cx="3202974" cy="1349119"/>
-          </a:xfrm>
-          <a:prstGeom prst="ellipse">
-            <a:avLst/>
-          </a:prstGeom>
-          <a:noFill/>
-          <a:ln>
-            <a:solidFill>
-              <a:schemeClr val="bg1"/>
-            </a:solidFill>
-          </a:ln>
-          <a:effectLst>
-            <a:outerShdw blurRad="596900" dist="50800" dir="5400000" sx="107000" sy="107000" algn="ctr" rotWithShape="0">
-              <a:schemeClr val="accent5">
-                <a:lumMod val="60000"/>
-                <a:lumOff val="40000"/>
-              </a:schemeClr>
-            </a:outerShdw>
-          </a:effectLst>
-        </p:spPr>
-        <p:style>
-          <a:lnRef idx="2">
-            <a:schemeClr val="accent4"/>
-          </a:lnRef>
-          <a:fillRef idx="1">
-            <a:schemeClr val="lt1"/>
-          </a:fillRef>
-          <a:effectRef idx="0">
-            <a:schemeClr val="accent4"/>
-          </a:effectRef>
-          <a:fontRef idx="minor">
-            <a:schemeClr val="dk1"/>
-          </a:fontRef>
-        </p:style>
-        <p:txBody>
-          <a:bodyPr rtlCol="0" anchor="ctr"/>
-          <a:lstStyle/>
-          <a:p>
-            <a:pPr algn="ctr"/>
-            <a:endParaRPr lang="ru-RU" dirty="0">
-              <a:highlight>
-                <a:srgbClr val="FFFF00"/>
-              </a:highlight>
-            </a:endParaRPr>
-          </a:p>
-        </p:txBody>
-      </p:sp>
-      <p:sp>
-        <p:nvSpPr>
-          <p:cNvPr id="44" name="Овал 43">
-            <a:extLst>
-              <a:ext uri="{FF2B5EF4-FFF2-40B4-BE49-F238E27FC236}">
-                <a16:creationId xmlns:a16="http://schemas.microsoft.com/office/drawing/2014/main" id="{DFC8E2C8-BC4F-4AF3-8D2D-F3CF1E2ED04C}"/>
-              </a:ext>
-            </a:extLst>
-          </p:cNvPr>
-          <p:cNvSpPr/>
-          <p:nvPr/>
-        </p:nvSpPr>
-        <p:spPr>
-          <a:xfrm>
-            <a:off x="281204" y="4440136"/>
-            <a:ext cx="3235086" cy="1362645"/>
-          </a:xfrm>
-          <a:prstGeom prst="ellipse">
-            <a:avLst/>
-          </a:prstGeom>
-          <a:noFill/>
-          <a:ln>
-            <a:solidFill>
-              <a:schemeClr val="bg1"/>
-            </a:solidFill>
-          </a:ln>
-          <a:effectLst>
-            <a:outerShdw blurRad="1270000" dist="50800" dir="5400000" sx="135000" sy="135000" algn="ctr" rotWithShape="0">
-              <a:schemeClr val="accent5">
-                <a:lumMod val="60000"/>
-                <a:lumOff val="40000"/>
-              </a:schemeClr>
-            </a:outerShdw>
-          </a:effectLst>
-        </p:spPr>
-        <p:style>
-          <a:lnRef idx="2">
-            <a:schemeClr val="accent4"/>
-          </a:lnRef>
-          <a:fillRef idx="1">
-            <a:schemeClr val="lt1"/>
-          </a:fillRef>
-          <a:effectRef idx="0">
-            <a:schemeClr val="accent4"/>
-          </a:effectRef>
-          <a:fontRef idx="minor">
-            <a:schemeClr val="dk1"/>
-          </a:fontRef>
-        </p:style>
-        <p:txBody>
-          <a:bodyPr rtlCol="0" anchor="ctr"/>
-          <a:lstStyle/>
-          <a:p>
-            <a:pPr algn="ctr"/>
-            <a:endParaRPr lang="ru-RU" dirty="0">
-              <a:highlight>
-                <a:srgbClr val="FFFF00"/>
-              </a:highlight>
-            </a:endParaRPr>
-          </a:p>
-        </p:txBody>
-      </p:sp>
-      <p:sp>
-        <p:nvSpPr>
-          <p:cNvPr id="45" name="Овал 44">
-            <a:extLst>
-              <a:ext uri="{FF2B5EF4-FFF2-40B4-BE49-F238E27FC236}">
-                <a16:creationId xmlns:a16="http://schemas.microsoft.com/office/drawing/2014/main" id="{EC6329EE-AA27-4EDC-8E42-047441FF07E5}"/>
-              </a:ext>
-            </a:extLst>
-          </p:cNvPr>
-          <p:cNvSpPr/>
-          <p:nvPr/>
-        </p:nvSpPr>
-        <p:spPr>
-          <a:xfrm>
-            <a:off x="8882876" y="4620235"/>
-            <a:ext cx="3235086" cy="1362645"/>
-          </a:xfrm>
-          <a:prstGeom prst="ellipse">
-            <a:avLst/>
-          </a:prstGeom>
-          <a:noFill/>
-          <a:ln>
-            <a:solidFill>
-              <a:schemeClr val="bg1"/>
-            </a:solidFill>
-          </a:ln>
-          <a:effectLst>
-            <a:outerShdw blurRad="1270000" dist="50800" dir="5400000" sx="135000" sy="135000" algn="ctr" rotWithShape="0">
-              <a:schemeClr val="accent5">
-                <a:lumMod val="60000"/>
-                <a:lumOff val="40000"/>
-              </a:schemeClr>
-            </a:outerShdw>
-          </a:effectLst>
-        </p:spPr>
-        <p:style>
-          <a:lnRef idx="2">
-            <a:schemeClr val="accent4"/>
-          </a:lnRef>
-          <a:fillRef idx="1">
-            <a:schemeClr val="lt1"/>
-          </a:fillRef>
-          <a:effectRef idx="0">
-            <a:schemeClr val="accent4"/>
-          </a:effectRef>
-          <a:fontRef idx="minor">
-            <a:schemeClr val="dk1"/>
-          </a:fontRef>
-        </p:style>
-        <p:txBody>
-          <a:bodyPr rtlCol="0" anchor="ctr"/>
-          <a:lstStyle/>
-          <a:p>
-            <a:pPr algn="ctr"/>
-            <a:endParaRPr lang="ru-RU" dirty="0">
-              <a:highlight>
-                <a:srgbClr val="FFFF00"/>
-              </a:highlight>
-            </a:endParaRPr>
-          </a:p>
-        </p:txBody>
-      </p:sp>
-      <p:sp>
-        <p:nvSpPr>
-          <p:cNvPr id="46" name="Овал 45">
-            <a:extLst>
-              <a:ext uri="{FF2B5EF4-FFF2-40B4-BE49-F238E27FC236}">
-                <a16:creationId xmlns:a16="http://schemas.microsoft.com/office/drawing/2014/main" id="{F8B002A9-09C6-461A-8F87-D153F63B420E}"/>
-              </a:ext>
-            </a:extLst>
-          </p:cNvPr>
-          <p:cNvSpPr/>
-          <p:nvPr/>
-        </p:nvSpPr>
-        <p:spPr>
-          <a:xfrm>
-            <a:off x="4744205" y="4595260"/>
-            <a:ext cx="3235086" cy="1362645"/>
-          </a:xfrm>
-          <a:prstGeom prst="ellipse">
-            <a:avLst/>
-          </a:prstGeom>
-          <a:noFill/>
-          <a:ln>
-            <a:solidFill>
-              <a:schemeClr val="bg1"/>
-            </a:solidFill>
-          </a:ln>
-          <a:effectLst>
-            <a:outerShdw blurRad="1270000" dist="50800" dir="5400000" sx="135000" sy="135000" algn="ctr" rotWithShape="0">
-              <a:schemeClr val="accent5">
-                <a:lumMod val="60000"/>
-                <a:lumOff val="40000"/>
-              </a:schemeClr>
-            </a:outerShdw>
-          </a:effectLst>
-        </p:spPr>
-        <p:style>
-          <a:lnRef idx="2">
-            <a:schemeClr val="accent4"/>
-          </a:lnRef>
-          <a:fillRef idx="1">
-            <a:schemeClr val="lt1"/>
-          </a:fillRef>
-          <a:effectRef idx="0">
-            <a:schemeClr val="accent4"/>
-          </a:effectRef>
-          <a:fontRef idx="minor">
-            <a:schemeClr val="dk1"/>
-          </a:fontRef>
-        </p:style>
-        <p:txBody>
-          <a:bodyPr rtlCol="0" anchor="ctr"/>
-          <a:lstStyle/>
-          <a:p>
-            <a:pPr algn="ctr"/>
-            <a:endParaRPr lang="ru-RU" dirty="0">
-              <a:highlight>
-                <a:srgbClr val="FFFF00"/>
-              </a:highlight>
-            </a:endParaRPr>
-          </a:p>
-        </p:txBody>
-      </p:sp>
     </p:spTree>
     <p:extLst>
       <p:ext uri="{BB962C8B-B14F-4D97-AF65-F5344CB8AC3E}">
@@ -6536,295 +6172,6 @@
           </a:p>
         </p:txBody>
       </p:sp>
-      <p:grpSp>
-        <p:nvGrpSpPr>
-          <p:cNvPr id="32" name="Группа 31">
-            <a:extLst>
-              <a:ext uri="{FF2B5EF4-FFF2-40B4-BE49-F238E27FC236}">
-                <a16:creationId xmlns:a16="http://schemas.microsoft.com/office/drawing/2014/main" id="{887EE5F8-5CE6-4220-B43C-3BEDE9AF710A}"/>
-              </a:ext>
-            </a:extLst>
-          </p:cNvPr>
-          <p:cNvGrpSpPr/>
-          <p:nvPr/>
-        </p:nvGrpSpPr>
-        <p:grpSpPr>
-          <a:xfrm>
-            <a:off x="-803312" y="2400648"/>
-            <a:ext cx="12672130" cy="3339751"/>
-            <a:chOff x="-420962" y="2569320"/>
-            <a:chExt cx="8370515" cy="2206057"/>
-          </a:xfrm>
-        </p:grpSpPr>
-        <p:sp>
-          <p:nvSpPr>
-            <p:cNvPr id="26" name="Прямоугольник: скругленные углы 25">
-              <a:extLst>
-                <a:ext uri="{FF2B5EF4-FFF2-40B4-BE49-F238E27FC236}">
-                  <a16:creationId xmlns:a16="http://schemas.microsoft.com/office/drawing/2014/main" id="{27F6CD6A-800C-4F03-9073-12A9CA5CC357}"/>
-                </a:ext>
-              </a:extLst>
-            </p:cNvPr>
-            <p:cNvSpPr/>
-            <p:nvPr/>
-          </p:nvSpPr>
-          <p:spPr>
-            <a:xfrm>
-              <a:off x="406390" y="2569320"/>
-              <a:ext cx="4055074" cy="2206057"/>
-            </a:xfrm>
-            <a:prstGeom prst="roundRect">
-              <a:avLst/>
-            </a:prstGeom>
-            <a:solidFill>
-              <a:srgbClr val="9575CD"/>
-            </a:solidFill>
-            <a:ln>
-              <a:solidFill>
-                <a:schemeClr val="bg1"/>
-              </a:solidFill>
-            </a:ln>
-            <a:effectLst/>
-          </p:spPr>
-          <p:style>
-            <a:lnRef idx="2">
-              <a:schemeClr val="accent1">
-                <a:shade val="50000"/>
-              </a:schemeClr>
-            </a:lnRef>
-            <a:fillRef idx="1">
-              <a:schemeClr val="accent1"/>
-            </a:fillRef>
-            <a:effectRef idx="0">
-              <a:schemeClr val="accent1"/>
-            </a:effectRef>
-            <a:fontRef idx="minor">
-              <a:schemeClr val="lt1"/>
-            </a:fontRef>
-          </p:style>
-          <p:txBody>
-            <a:bodyPr rtlCol="0" anchor="ctr"/>
-            <a:lstStyle/>
-            <a:p>
-              <a:pPr algn="ctr"/>
-              <a:endParaRPr lang="ru-RU" dirty="0"/>
-            </a:p>
-          </p:txBody>
-        </p:sp>
-        <p:sp>
-          <p:nvSpPr>
-            <p:cNvPr id="28" name="Прямоугольник: скругленные углы 27">
-              <a:extLst>
-                <a:ext uri="{FF2B5EF4-FFF2-40B4-BE49-F238E27FC236}">
-                  <a16:creationId xmlns:a16="http://schemas.microsoft.com/office/drawing/2014/main" id="{BB859163-91AA-448C-B89B-CFC6F193B60B}"/>
-                </a:ext>
-              </a:extLst>
-            </p:cNvPr>
-            <p:cNvSpPr/>
-            <p:nvPr/>
-          </p:nvSpPr>
-          <p:spPr>
-            <a:xfrm>
-              <a:off x="5599580" y="3340276"/>
-              <a:ext cx="2349973" cy="1278441"/>
-            </a:xfrm>
-            <a:prstGeom prst="roundRect">
-              <a:avLst/>
-            </a:prstGeom>
-            <a:solidFill>
-              <a:srgbClr val="9575CD"/>
-            </a:solidFill>
-            <a:ln>
-              <a:solidFill>
-                <a:schemeClr val="bg1"/>
-              </a:solidFill>
-            </a:ln>
-            <a:effectLst/>
-          </p:spPr>
-          <p:style>
-            <a:lnRef idx="2">
-              <a:schemeClr val="accent1">
-                <a:shade val="50000"/>
-              </a:schemeClr>
-            </a:lnRef>
-            <a:fillRef idx="1">
-              <a:schemeClr val="accent1"/>
-            </a:fillRef>
-            <a:effectRef idx="0">
-              <a:schemeClr val="accent1"/>
-            </a:effectRef>
-            <a:fontRef idx="minor">
-              <a:schemeClr val="lt1"/>
-            </a:fontRef>
-          </p:style>
-          <p:txBody>
-            <a:bodyPr rtlCol="0" anchor="ctr"/>
-            <a:lstStyle/>
-            <a:p>
-              <a:pPr algn="ctr"/>
-              <a:r>
-                <a:rPr lang="ru-RU" sz="4000" dirty="0"/>
-                <a:t>КЛИЕНТ</a:t>
-              </a:r>
-            </a:p>
-          </p:txBody>
-        </p:sp>
-        <p:sp>
-          <p:nvSpPr>
-            <p:cNvPr id="3" name="TextBox 2">
-              <a:extLst>
-                <a:ext uri="{FF2B5EF4-FFF2-40B4-BE49-F238E27FC236}">
-                  <a16:creationId xmlns:a16="http://schemas.microsoft.com/office/drawing/2014/main" id="{D74C8681-D558-4681-8DC7-21A78F3D9920}"/>
-                </a:ext>
-              </a:extLst>
-            </p:cNvPr>
-            <p:cNvSpPr txBox="1"/>
-            <p:nvPr/>
-          </p:nvSpPr>
-          <p:spPr>
-            <a:xfrm>
-              <a:off x="-420962" y="2586686"/>
-              <a:ext cx="5830037" cy="467591"/>
-            </a:xfrm>
-            <a:prstGeom prst="rect">
-              <a:avLst/>
-            </a:prstGeom>
-            <a:noFill/>
-          </p:spPr>
-          <p:txBody>
-            <a:bodyPr wrap="square" rtlCol="0">
-              <a:spAutoFit/>
-            </a:bodyPr>
-            <a:lstStyle/>
-            <a:p>
-              <a:pPr algn="ctr"/>
-              <a:r>
-                <a:rPr lang="ru-RU" sz="4000" dirty="0">
-                  <a:solidFill>
-                    <a:schemeClr val="bg1"/>
-                  </a:solidFill>
-                </a:rPr>
-                <a:t>СЕРВЕР ВИРТУАЛИЗАЦИИ</a:t>
-              </a:r>
-            </a:p>
-          </p:txBody>
-        </p:sp>
-        <p:sp>
-          <p:nvSpPr>
-            <p:cNvPr id="29" name="Прямоугольник: скругленные углы 28">
-              <a:extLst>
-                <a:ext uri="{FF2B5EF4-FFF2-40B4-BE49-F238E27FC236}">
-                  <a16:creationId xmlns:a16="http://schemas.microsoft.com/office/drawing/2014/main" id="{53B8246F-D947-419B-986C-EE726552352A}"/>
-                </a:ext>
-              </a:extLst>
-            </p:cNvPr>
-            <p:cNvSpPr/>
-            <p:nvPr/>
-          </p:nvSpPr>
-          <p:spPr>
-            <a:xfrm>
-              <a:off x="646280" y="3342844"/>
-              <a:ext cx="3684938" cy="1278441"/>
-            </a:xfrm>
-            <a:prstGeom prst="roundRect">
-              <a:avLst/>
-            </a:prstGeom>
-            <a:solidFill>
-              <a:srgbClr val="9575CD"/>
-            </a:solidFill>
-            <a:ln>
-              <a:solidFill>
-                <a:schemeClr val="bg1"/>
-              </a:solidFill>
-            </a:ln>
-            <a:effectLst/>
-          </p:spPr>
-          <p:style>
-            <a:lnRef idx="2">
-              <a:schemeClr val="accent1">
-                <a:shade val="50000"/>
-              </a:schemeClr>
-            </a:lnRef>
-            <a:fillRef idx="1">
-              <a:schemeClr val="accent1"/>
-            </a:fillRef>
-            <a:effectRef idx="0">
-              <a:schemeClr val="accent1"/>
-            </a:effectRef>
-            <a:fontRef idx="minor">
-              <a:schemeClr val="lt1"/>
-            </a:fontRef>
-          </p:style>
-          <p:txBody>
-            <a:bodyPr rtlCol="0" anchor="ctr"/>
-            <a:lstStyle/>
-            <a:p>
-              <a:pPr algn="ctr"/>
-              <a:r>
-                <a:rPr lang="ru-RU" sz="2400" dirty="0"/>
-                <a:t>Виртуальный выделенный сервер</a:t>
-              </a:r>
-              <a:br>
-                <a:rPr lang="en-US" sz="4000" dirty="0"/>
-              </a:br>
-              <a:r>
-                <a:rPr lang="ru-RU" sz="4000" dirty="0"/>
-                <a:t>Сервер СУБД </a:t>
-              </a:r>
-              <a:r>
-                <a:rPr lang="en-US" sz="4000" dirty="0"/>
-                <a:t>MySQL</a:t>
-              </a:r>
-              <a:endParaRPr lang="ru-RU" sz="4000" dirty="0"/>
-            </a:p>
-          </p:txBody>
-        </p:sp>
-        <p:cxnSp>
-          <p:nvCxnSpPr>
-            <p:cNvPr id="6" name="Прямая соединительная линия 5">
-              <a:extLst>
-                <a:ext uri="{FF2B5EF4-FFF2-40B4-BE49-F238E27FC236}">
-                  <a16:creationId xmlns:a16="http://schemas.microsoft.com/office/drawing/2014/main" id="{F2BA3EF0-A57A-4EF5-9069-442131D1F47E}"/>
-                </a:ext>
-              </a:extLst>
-            </p:cNvPr>
-            <p:cNvCxnSpPr>
-              <a:cxnSpLocks/>
-              <a:stCxn id="28" idx="1"/>
-              <a:endCxn id="29" idx="3"/>
-            </p:cNvCxnSpPr>
-            <p:nvPr/>
-          </p:nvCxnSpPr>
-          <p:spPr>
-            <a:xfrm flipH="1">
-              <a:off x="4331218" y="3979497"/>
-              <a:ext cx="1268362" cy="2568"/>
-            </a:xfrm>
-            <a:prstGeom prst="line">
-              <a:avLst/>
-            </a:prstGeom>
-            <a:ln>
-              <a:solidFill>
-                <a:schemeClr val="bg1"/>
-              </a:solidFill>
-            </a:ln>
-          </p:spPr>
-          <p:style>
-            <a:lnRef idx="1">
-              <a:schemeClr val="accent1"/>
-            </a:lnRef>
-            <a:fillRef idx="0">
-              <a:schemeClr val="accent1"/>
-            </a:fillRef>
-            <a:effectRef idx="0">
-              <a:schemeClr val="accent1"/>
-            </a:effectRef>
-            <a:fontRef idx="minor">
-              <a:schemeClr val="tx1"/>
-            </a:fontRef>
-          </p:style>
-        </p:cxnSp>
-      </p:grpSp>
       <p:sp>
         <p:nvSpPr>
           <p:cNvPr id="39" name="TextBox 38">
@@ -6883,279 +6230,35 @@
           </a:p>
         </p:txBody>
       </p:sp>
-      <p:sp>
-        <p:nvSpPr>
-          <p:cNvPr id="5" name="TextBox 4">
-            <a:extLst>
-              <a:ext uri="{FF2B5EF4-FFF2-40B4-BE49-F238E27FC236}">
-                <a16:creationId xmlns:a16="http://schemas.microsoft.com/office/drawing/2014/main" id="{F79AA4B6-267C-45C8-9874-6227779D8103}"/>
-              </a:ext>
-            </a:extLst>
-          </p:cNvPr>
-          <p:cNvSpPr txBox="1"/>
+      <p:pic>
+        <p:nvPicPr>
+          <p:cNvPr id="8" name="Рисунок 7">
+            <a:extLst>
+              <a:ext uri="{FF2B5EF4-FFF2-40B4-BE49-F238E27FC236}">
+                <a16:creationId xmlns:a16="http://schemas.microsoft.com/office/drawing/2014/main" id="{C4426351-A63B-4CD1-8515-DF0C0D9A1878}"/>
+              </a:ext>
+            </a:extLst>
+          </p:cNvPr>
+          <p:cNvPicPr>
+            <a:picLocks noChangeAspect="1"/>
+          </p:cNvPicPr>
           <p:nvPr/>
-        </p:nvSpPr>
+        </p:nvPicPr>
+        <p:blipFill rotWithShape="1">
+          <a:blip r:embed="rId3"/>
+          <a:srcRect t="2897" b="2589"/>
+          <a:stretch/>
+        </p:blipFill>
         <p:spPr>
           <a:xfrm>
-            <a:off x="6610851" y="4161359"/>
-            <a:ext cx="1583033" cy="369332"/>
+            <a:off x="406392" y="2108200"/>
+            <a:ext cx="11072970" cy="3708400"/>
           </a:xfrm>
           <a:prstGeom prst="rect">
             <a:avLst/>
           </a:prstGeom>
-          <a:noFill/>
-        </p:spPr>
-        <p:txBody>
-          <a:bodyPr wrap="square" rtlCol="0">
-            <a:spAutoFit/>
-          </a:bodyPr>
-          <a:lstStyle/>
-          <a:p>
-            <a:r>
-              <a:rPr lang="ru-RU" dirty="0">
-                <a:solidFill>
-                  <a:schemeClr val="bg1"/>
-                </a:solidFill>
-                <a:latin typeface="Verdana" panose="020B0604030504040204" pitchFamily="34" charset="0"/>
-                <a:ea typeface="Verdana" panose="020B0604030504040204" pitchFamily="34" charset="0"/>
-              </a:rPr>
-              <a:t>63307</a:t>
-            </a:r>
-            <a:r>
-              <a:rPr lang="en-US" dirty="0">
-                <a:solidFill>
-                  <a:schemeClr val="bg1"/>
-                </a:solidFill>
-                <a:latin typeface="Verdana" panose="020B0604030504040204" pitchFamily="34" charset="0"/>
-                <a:ea typeface="Verdana" panose="020B0604030504040204" pitchFamily="34" charset="0"/>
-              </a:rPr>
-              <a:t>/</a:t>
-            </a:r>
-            <a:r>
-              <a:rPr lang="en-US" dirty="0" err="1">
-                <a:solidFill>
-                  <a:schemeClr val="bg1"/>
-                </a:solidFill>
-                <a:latin typeface="Verdana" panose="020B0604030504040204" pitchFamily="34" charset="0"/>
-                <a:ea typeface="Verdana" panose="020B0604030504040204" pitchFamily="34" charset="0"/>
-              </a:rPr>
-              <a:t>tcp</a:t>
-            </a:r>
-            <a:endParaRPr lang="ru-RU" dirty="0">
-              <a:solidFill>
-                <a:schemeClr val="bg1"/>
-              </a:solidFill>
-              <a:latin typeface="Verdana" panose="020B0604030504040204" pitchFamily="34" charset="0"/>
-              <a:ea typeface="Verdana" panose="020B0604030504040204" pitchFamily="34" charset="0"/>
-            </a:endParaRPr>
-          </a:p>
-        </p:txBody>
-      </p:sp>
-      <p:sp>
-        <p:nvSpPr>
-          <p:cNvPr id="14" name="TextBox 13">
-            <a:extLst>
-              <a:ext uri="{FF2B5EF4-FFF2-40B4-BE49-F238E27FC236}">
-                <a16:creationId xmlns:a16="http://schemas.microsoft.com/office/drawing/2014/main" id="{05391C4B-0CAA-4AEC-AA3D-03FE19959F59}"/>
-              </a:ext>
-            </a:extLst>
-          </p:cNvPr>
-          <p:cNvSpPr txBox="1"/>
-          <p:nvPr/>
-        </p:nvSpPr>
-        <p:spPr>
-          <a:xfrm>
-            <a:off x="-559022" y="3063316"/>
-            <a:ext cx="8155457" cy="461665"/>
-          </a:xfrm>
-          <a:prstGeom prst="rect">
-            <a:avLst/>
-          </a:prstGeom>
-          <a:noFill/>
-        </p:spPr>
-        <p:txBody>
-          <a:bodyPr wrap="square" rtlCol="0">
-            <a:spAutoFit/>
-          </a:bodyPr>
-          <a:lstStyle/>
-          <a:p>
-            <a:pPr algn="ctr"/>
-            <a:r>
-              <a:rPr lang="en-US" sz="2400" dirty="0" err="1">
-                <a:solidFill>
-                  <a:schemeClr val="bg1"/>
-                </a:solidFill>
-              </a:rPr>
-              <a:t>Proxmox</a:t>
-            </a:r>
-            <a:r>
-              <a:rPr lang="en-US" sz="2400" dirty="0">
-                <a:solidFill>
-                  <a:schemeClr val="bg1"/>
-                </a:solidFill>
-              </a:rPr>
-              <a:t> Virtual </a:t>
-            </a:r>
-            <a:r>
-              <a:rPr lang="en-US" sz="2400" dirty="0" err="1">
-                <a:solidFill>
-                  <a:schemeClr val="bg1"/>
-                </a:solidFill>
-              </a:rPr>
-              <a:t>Enviroment</a:t>
-            </a:r>
-            <a:endParaRPr lang="ru-RU" sz="2400" dirty="0">
-              <a:solidFill>
-                <a:schemeClr val="bg1"/>
-              </a:solidFill>
-            </a:endParaRPr>
-          </a:p>
-        </p:txBody>
-      </p:sp>
-      <p:sp>
-        <p:nvSpPr>
-          <p:cNvPr id="9" name="TextBox 8">
-            <a:extLst>
-              <a:ext uri="{FF2B5EF4-FFF2-40B4-BE49-F238E27FC236}">
-                <a16:creationId xmlns:a16="http://schemas.microsoft.com/office/drawing/2014/main" id="{B1BCBF1B-53EF-450C-B5CA-0A8A55068352}"/>
-              </a:ext>
-            </a:extLst>
-          </p:cNvPr>
-          <p:cNvSpPr txBox="1"/>
-          <p:nvPr/>
-        </p:nvSpPr>
-        <p:spPr>
-          <a:xfrm>
-            <a:off x="-4702629" y="-1712686"/>
-            <a:ext cx="4143607" cy="6740307"/>
-          </a:xfrm>
-          <a:prstGeom prst="rect">
-            <a:avLst/>
-          </a:prstGeom>
-          <a:noFill/>
-        </p:spPr>
-        <p:txBody>
-          <a:bodyPr wrap="square" rtlCol="0">
-            <a:spAutoFit/>
-          </a:bodyPr>
-          <a:lstStyle/>
-          <a:p>
-            <a:r>
-              <a:rPr lang="ru-RU" dirty="0"/>
-              <a:t>Серверная часть реализована в виде СУБД </a:t>
-            </a:r>
-            <a:r>
-              <a:rPr lang="en-US" dirty="0" err="1"/>
-              <a:t>MySql</a:t>
-            </a:r>
-            <a:r>
-              <a:rPr lang="ru-RU" dirty="0"/>
-              <a:t>, развернутой на  виртуальном выделенном сервере в кластере (кластер несколько устройств в одном которые выполняют одну задачу) </a:t>
-            </a:r>
-            <a:r>
-              <a:rPr lang="en-US" dirty="0" err="1"/>
-              <a:t>Proxmox</a:t>
-            </a:r>
-            <a:r>
-              <a:rPr lang="en-US" dirty="0"/>
-              <a:t> (</a:t>
-            </a:r>
-            <a:r>
-              <a:rPr lang="ru-RU" dirty="0"/>
-              <a:t>система виртуализации с открытым исходным кодом распространяется по открытой лицензии </a:t>
-            </a:r>
-            <a:r>
-              <a:rPr lang="en-US" dirty="0"/>
-              <a:t>GNU AGPLv3</a:t>
-            </a:r>
-            <a:r>
-              <a:rPr lang="ru-RU" dirty="0"/>
-              <a:t> которая позволяет использовать ее в коммерческих целях без покупки лицензии</a:t>
-            </a:r>
-            <a:r>
-              <a:rPr lang="en-US" dirty="0"/>
-              <a:t>)</a:t>
-            </a:r>
-            <a:r>
-              <a:rPr lang="ru-RU" dirty="0"/>
-              <a:t>.</a:t>
-            </a:r>
-            <a:br>
-              <a:rPr lang="en-US" dirty="0"/>
-            </a:br>
-            <a:br>
-              <a:rPr lang="en-US" dirty="0"/>
-            </a:br>
-            <a:r>
-              <a:rPr lang="ru-RU" dirty="0"/>
-              <a:t>Бесплатно и открытый код</a:t>
-            </a:r>
-            <a:br>
-              <a:rPr lang="ru-RU" dirty="0"/>
-            </a:br>
-            <a:br>
-              <a:rPr lang="ru-RU" dirty="0"/>
-            </a:br>
-            <a:r>
-              <a:rPr lang="ru-RU" dirty="0"/>
-              <a:t>клиентское часть представляет собой десктопное приложение</a:t>
-            </a:r>
-            <a:r>
-              <a:rPr lang="en-US" dirty="0"/>
-              <a:t> </a:t>
-            </a:r>
-            <a:r>
-              <a:rPr lang="ru-RU" dirty="0"/>
-              <a:t>на </a:t>
-            </a:r>
-            <a:r>
-              <a:rPr lang="en-US" dirty="0" err="1"/>
-              <a:t>wpf</a:t>
-            </a:r>
-            <a:r>
-              <a:rPr lang="en-US" dirty="0"/>
-              <a:t> </a:t>
-            </a:r>
-            <a:r>
-              <a:rPr lang="en-US" dirty="0" err="1"/>
-              <a:t>c#</a:t>
-            </a:r>
-            <a:br>
-              <a:rPr lang="ru-RU" dirty="0"/>
-            </a:br>
-            <a:br>
-              <a:rPr lang="ru-RU" dirty="0"/>
-            </a:br>
-            <a:r>
-              <a:rPr lang="ru-RU" dirty="0"/>
-              <a:t>серверная часть представлена СУБД </a:t>
-            </a:r>
-            <a:r>
-              <a:rPr lang="en-US" dirty="0"/>
-              <a:t>MySQL </a:t>
-            </a:r>
-            <a:r>
-              <a:rPr lang="ru-RU" dirty="0"/>
-              <a:t>которая развернута на виртуальной машине внутри системы виртуализации </a:t>
-            </a:r>
-            <a:r>
-              <a:rPr lang="en-US" dirty="0" err="1"/>
-              <a:t>Proxmox</a:t>
-            </a:r>
-            <a:br>
-              <a:rPr lang="en-US" dirty="0"/>
-            </a:br>
-            <a:endParaRPr lang="en-US" dirty="0"/>
-          </a:p>
-          <a:p>
-            <a:r>
-              <a:rPr lang="en-US" dirty="0"/>
-              <a:t>Oracle </a:t>
-            </a:r>
-            <a:endParaRPr lang="ru-RU" dirty="0"/>
-          </a:p>
-        </p:txBody>
-      </p:sp>
+        </p:spPr>
+      </p:pic>
     </p:spTree>
     <p:extLst>
       <p:ext uri="{BB962C8B-B14F-4D97-AF65-F5344CB8AC3E}">

</xml_diff>